<commit_message>
The latest slides used in the meeting in Jun 17.
</commit_message>
<xml_diff>
--- a/Exa.TrkX/Jun17_2020_meeting.pptx
+++ b/Exa.TrkX/Jun17_2020_meeting.pptx
@@ -113,6 +113,154 @@
 </p:presentation>
 </file>
 
+<file path=ppt/revisionInfo.xml><?xml version="1.0" encoding="utf-8"?>
+<p1510:revInfo xmlns:a="http://schemas.openxmlformats.org/drawingml/2006/main" xmlns:r="http://schemas.openxmlformats.org/officeDocument/2006/relationships" xmlns:p1510="http://schemas.microsoft.com/office/powerpoint/2015/10/main">
+  <p1510:revLst>
+    <p1510:client id="{896FC0F8-311E-46ED-B15D-8CDD1FD73E22}" v="10" dt="2020-06-17T18:05:28.739"/>
+  </p1510:revLst>
+</p1510:revInfo>
+</file>
+
+<file path=ppt/changesInfos/changesInfo1.xml><?xml version="1.0" encoding="utf-8"?>
+<pc:chgInfo xmlns:a="http://schemas.openxmlformats.org/drawingml/2006/main" xmlns:r="http://schemas.openxmlformats.org/officeDocument/2006/relationships" xmlns:ac="http://schemas.microsoft.com/office/drawing/2013/main/command" xmlns:pc="http://schemas.microsoft.com/office/powerpoint/2013/main/command">
+  <pc:docChgLst>
+    <pc:chgData name="Lee Sunwoo" userId="0bca74bcbcfcfb9e" providerId="LiveId" clId="{896FC0F8-311E-46ED-B15D-8CDD1FD73E22}"/>
+    <pc:docChg chg="undo custSel modSld">
+      <pc:chgData name="Lee Sunwoo" userId="0bca74bcbcfcfb9e" providerId="LiveId" clId="{896FC0F8-311E-46ED-B15D-8CDD1FD73E22}" dt="2020-06-18T18:19:34.106" v="269" actId="20577"/>
+      <pc:docMkLst>
+        <pc:docMk/>
+      </pc:docMkLst>
+      <pc:sldChg chg="modSp mod">
+        <pc:chgData name="Lee Sunwoo" userId="0bca74bcbcfcfb9e" providerId="LiveId" clId="{896FC0F8-311E-46ED-B15D-8CDD1FD73E22}" dt="2020-06-18T18:19:34.106" v="269" actId="20577"/>
+        <pc:sldMkLst>
+          <pc:docMk/>
+          <pc:sldMk cId="1076604348" sldId="257"/>
+        </pc:sldMkLst>
+        <pc:spChg chg="mod">
+          <ac:chgData name="Lee Sunwoo" userId="0bca74bcbcfcfb9e" providerId="LiveId" clId="{896FC0F8-311E-46ED-B15D-8CDD1FD73E22}" dt="2020-06-18T18:19:34.106" v="269" actId="20577"/>
+          <ac:spMkLst>
+            <pc:docMk/>
+            <pc:sldMk cId="1076604348" sldId="257"/>
+            <ac:spMk id="3" creationId="{D0C4E928-6326-4941-9E92-0C73164B9A86}"/>
+          </ac:spMkLst>
+        </pc:spChg>
+      </pc:sldChg>
+      <pc:sldChg chg="addSp delSp modSp mod">
+        <pc:chgData name="Lee Sunwoo" userId="0bca74bcbcfcfb9e" providerId="LiveId" clId="{896FC0F8-311E-46ED-B15D-8CDD1FD73E22}" dt="2020-06-17T18:05:48.165" v="145" actId="1038"/>
+        <pc:sldMkLst>
+          <pc:docMk/>
+          <pc:sldMk cId="3121065195" sldId="258"/>
+        </pc:sldMkLst>
+        <pc:spChg chg="mod">
+          <ac:chgData name="Lee Sunwoo" userId="0bca74bcbcfcfb9e" providerId="LiveId" clId="{896FC0F8-311E-46ED-B15D-8CDD1FD73E22}" dt="2020-06-17T18:05:24.235" v="133" actId="14100"/>
+          <ac:spMkLst>
+            <pc:docMk/>
+            <pc:sldMk cId="3121065195" sldId="258"/>
+            <ac:spMk id="3" creationId="{1BEB7D00-8BE5-45A6-A5EB-516178D22863}"/>
+          </ac:spMkLst>
+        </pc:spChg>
+        <pc:spChg chg="add mod">
+          <ac:chgData name="Lee Sunwoo" userId="0bca74bcbcfcfb9e" providerId="LiveId" clId="{896FC0F8-311E-46ED-B15D-8CDD1FD73E22}" dt="2020-06-17T18:05:48.165" v="145" actId="1038"/>
+          <ac:spMkLst>
+            <pc:docMk/>
+            <pc:sldMk cId="3121065195" sldId="258"/>
+            <ac:spMk id="20" creationId="{E61429FD-5446-42DD-B453-51CAAAAF6553}"/>
+          </ac:spMkLst>
+        </pc:spChg>
+        <pc:spChg chg="add mod">
+          <ac:chgData name="Lee Sunwoo" userId="0bca74bcbcfcfb9e" providerId="LiveId" clId="{896FC0F8-311E-46ED-B15D-8CDD1FD73E22}" dt="2020-06-17T18:05:48.165" v="145" actId="1038"/>
+          <ac:spMkLst>
+            <pc:docMk/>
+            <pc:sldMk cId="3121065195" sldId="258"/>
+            <ac:spMk id="21" creationId="{1023C5AA-5DC2-4883-8F19-0B255C68F04C}"/>
+          </ac:spMkLst>
+        </pc:spChg>
+        <pc:spChg chg="add mod">
+          <ac:chgData name="Lee Sunwoo" userId="0bca74bcbcfcfb9e" providerId="LiveId" clId="{896FC0F8-311E-46ED-B15D-8CDD1FD73E22}" dt="2020-06-17T18:05:48.165" v="145" actId="1038"/>
+          <ac:spMkLst>
+            <pc:docMk/>
+            <pc:sldMk cId="3121065195" sldId="258"/>
+            <ac:spMk id="22" creationId="{059F31EE-467F-405E-9731-0AB86A9B26B7}"/>
+          </ac:spMkLst>
+        </pc:spChg>
+        <pc:spChg chg="add mod">
+          <ac:chgData name="Lee Sunwoo" userId="0bca74bcbcfcfb9e" providerId="LiveId" clId="{896FC0F8-311E-46ED-B15D-8CDD1FD73E22}" dt="2020-06-17T18:05:48.165" v="145" actId="1038"/>
+          <ac:spMkLst>
+            <pc:docMk/>
+            <pc:sldMk cId="3121065195" sldId="258"/>
+            <ac:spMk id="23" creationId="{8856E701-BB8F-4850-B733-FB90A593D590}"/>
+          </ac:spMkLst>
+        </pc:spChg>
+        <pc:picChg chg="add del mod">
+          <ac:chgData name="Lee Sunwoo" userId="0bca74bcbcfcfb9e" providerId="LiveId" clId="{896FC0F8-311E-46ED-B15D-8CDD1FD73E22}" dt="2020-06-17T18:03:27.982" v="78"/>
+          <ac:picMkLst>
+            <pc:docMk/>
+            <pc:sldMk cId="3121065195" sldId="258"/>
+            <ac:picMk id="5" creationId="{4BC5A7BD-E55B-43DC-98ED-707183D7747D}"/>
+          </ac:picMkLst>
+        </pc:picChg>
+        <pc:picChg chg="add del mod">
+          <ac:chgData name="Lee Sunwoo" userId="0bca74bcbcfcfb9e" providerId="LiveId" clId="{896FC0F8-311E-46ED-B15D-8CDD1FD73E22}" dt="2020-06-17T18:03:27.982" v="78"/>
+          <ac:picMkLst>
+            <pc:docMk/>
+            <pc:sldMk cId="3121065195" sldId="258"/>
+            <ac:picMk id="7" creationId="{AA2344AC-ABFF-486A-B266-8FEC47624F98}"/>
+          </ac:picMkLst>
+        </pc:picChg>
+        <pc:picChg chg="add del mod">
+          <ac:chgData name="Lee Sunwoo" userId="0bca74bcbcfcfb9e" providerId="LiveId" clId="{896FC0F8-311E-46ED-B15D-8CDD1FD73E22}" dt="2020-06-17T18:03:27.982" v="78"/>
+          <ac:picMkLst>
+            <pc:docMk/>
+            <pc:sldMk cId="3121065195" sldId="258"/>
+            <ac:picMk id="9" creationId="{FF5A0AEB-4AAD-406A-8298-03372CDA14B4}"/>
+          </ac:picMkLst>
+        </pc:picChg>
+        <pc:picChg chg="add del mod">
+          <ac:chgData name="Lee Sunwoo" userId="0bca74bcbcfcfb9e" providerId="LiveId" clId="{896FC0F8-311E-46ED-B15D-8CDD1FD73E22}" dt="2020-06-17T18:03:27.982" v="78"/>
+          <ac:picMkLst>
+            <pc:docMk/>
+            <pc:sldMk cId="3121065195" sldId="258"/>
+            <ac:picMk id="11" creationId="{2BFDCACA-77CE-4C06-BF64-726F8B10406E}"/>
+          </ac:picMkLst>
+        </pc:picChg>
+        <pc:picChg chg="add mod">
+          <ac:chgData name="Lee Sunwoo" userId="0bca74bcbcfcfb9e" providerId="LiveId" clId="{896FC0F8-311E-46ED-B15D-8CDD1FD73E22}" dt="2020-06-17T18:05:48.165" v="145" actId="1038"/>
+          <ac:picMkLst>
+            <pc:docMk/>
+            <pc:sldMk cId="3121065195" sldId="258"/>
+            <ac:picMk id="13" creationId="{A5351316-3936-4367-80E7-B6A41FF6953C}"/>
+          </ac:picMkLst>
+        </pc:picChg>
+        <pc:picChg chg="add mod">
+          <ac:chgData name="Lee Sunwoo" userId="0bca74bcbcfcfb9e" providerId="LiveId" clId="{896FC0F8-311E-46ED-B15D-8CDD1FD73E22}" dt="2020-06-17T18:05:48.165" v="145" actId="1038"/>
+          <ac:picMkLst>
+            <pc:docMk/>
+            <pc:sldMk cId="3121065195" sldId="258"/>
+            <ac:picMk id="15" creationId="{3E3D5389-4934-4506-B5B1-F0063BEA4E39}"/>
+          </ac:picMkLst>
+        </pc:picChg>
+        <pc:picChg chg="add mod">
+          <ac:chgData name="Lee Sunwoo" userId="0bca74bcbcfcfb9e" providerId="LiveId" clId="{896FC0F8-311E-46ED-B15D-8CDD1FD73E22}" dt="2020-06-17T18:05:48.165" v="145" actId="1038"/>
+          <ac:picMkLst>
+            <pc:docMk/>
+            <pc:sldMk cId="3121065195" sldId="258"/>
+            <ac:picMk id="17" creationId="{80C39624-526C-4E20-85F1-0C1C9F36729B}"/>
+          </ac:picMkLst>
+        </pc:picChg>
+        <pc:picChg chg="add mod">
+          <ac:chgData name="Lee Sunwoo" userId="0bca74bcbcfcfb9e" providerId="LiveId" clId="{896FC0F8-311E-46ED-B15D-8CDD1FD73E22}" dt="2020-06-17T18:05:48.165" v="145" actId="1038"/>
+          <ac:picMkLst>
+            <pc:docMk/>
+            <pc:sldMk cId="3121065195" sldId="258"/>
+            <ac:picMk id="19" creationId="{BFD30C74-B219-4FBC-8423-C57450DC6334}"/>
+          </ac:picMkLst>
+        </pc:picChg>
+      </pc:sldChg>
+    </pc:docChg>
+  </pc:docChgLst>
+</pc:chgInfo>
+</file>
+
 <file path=ppt/slideLayouts/slideLayout1.xml><?xml version="1.0" encoding="utf-8"?>
 <p:sldLayout xmlns:a="http://schemas.openxmlformats.org/drawingml/2006/main" xmlns:r="http://schemas.openxmlformats.org/officeDocument/2006/relationships" xmlns:p="http://schemas.openxmlformats.org/presentationml/2006/main" type="title" preserve="1">
   <p:cSld name="Title Slide">
@@ -260,7 +408,7 @@
           <a:p>
             <a:fld id="{EF8CFD31-5838-49E1-8FEB-F96CA9ABA4BD}" type="datetimeFigureOut">
               <a:rPr lang="en-US" smtClean="0"/>
-              <a:t>6/17/20</a:t>
+              <a:t>6/18/2020</a:t>
             </a:fld>
             <a:endParaRPr lang="en-US"/>
           </a:p>
@@ -458,7 +606,7 @@
           <a:p>
             <a:fld id="{EF8CFD31-5838-49E1-8FEB-F96CA9ABA4BD}" type="datetimeFigureOut">
               <a:rPr lang="en-US" smtClean="0"/>
-              <a:t>6/17/20</a:t>
+              <a:t>6/18/2020</a:t>
             </a:fld>
             <a:endParaRPr lang="en-US"/>
           </a:p>
@@ -666,7 +814,7 @@
           <a:p>
             <a:fld id="{EF8CFD31-5838-49E1-8FEB-F96CA9ABA4BD}" type="datetimeFigureOut">
               <a:rPr lang="en-US" smtClean="0"/>
-              <a:t>6/17/20</a:t>
+              <a:t>6/18/2020</a:t>
             </a:fld>
             <a:endParaRPr lang="en-US"/>
           </a:p>
@@ -864,7 +1012,7 @@
           <a:p>
             <a:fld id="{EF8CFD31-5838-49E1-8FEB-F96CA9ABA4BD}" type="datetimeFigureOut">
               <a:rPr lang="en-US" smtClean="0"/>
-              <a:t>6/17/20</a:t>
+              <a:t>6/18/2020</a:t>
             </a:fld>
             <a:endParaRPr lang="en-US"/>
           </a:p>
@@ -1139,7 +1287,7 @@
           <a:p>
             <a:fld id="{EF8CFD31-5838-49E1-8FEB-F96CA9ABA4BD}" type="datetimeFigureOut">
               <a:rPr lang="en-US" smtClean="0"/>
-              <a:t>6/17/20</a:t>
+              <a:t>6/18/2020</a:t>
             </a:fld>
             <a:endParaRPr lang="en-US"/>
           </a:p>
@@ -1404,7 +1552,7 @@
           <a:p>
             <a:fld id="{EF8CFD31-5838-49E1-8FEB-F96CA9ABA4BD}" type="datetimeFigureOut">
               <a:rPr lang="en-US" smtClean="0"/>
-              <a:t>6/17/20</a:t>
+              <a:t>6/18/2020</a:t>
             </a:fld>
             <a:endParaRPr lang="en-US"/>
           </a:p>
@@ -1816,7 +1964,7 @@
           <a:p>
             <a:fld id="{EF8CFD31-5838-49E1-8FEB-F96CA9ABA4BD}" type="datetimeFigureOut">
               <a:rPr lang="en-US" smtClean="0"/>
-              <a:t>6/17/20</a:t>
+              <a:t>6/18/2020</a:t>
             </a:fld>
             <a:endParaRPr lang="en-US"/>
           </a:p>
@@ -1957,7 +2105,7 @@
           <a:p>
             <a:fld id="{EF8CFD31-5838-49E1-8FEB-F96CA9ABA4BD}" type="datetimeFigureOut">
               <a:rPr lang="en-US" smtClean="0"/>
-              <a:t>6/17/20</a:t>
+              <a:t>6/18/2020</a:t>
             </a:fld>
             <a:endParaRPr lang="en-US"/>
           </a:p>
@@ -2070,7 +2218,7 @@
           <a:p>
             <a:fld id="{EF8CFD31-5838-49E1-8FEB-F96CA9ABA4BD}" type="datetimeFigureOut">
               <a:rPr lang="en-US" smtClean="0"/>
-              <a:t>6/17/20</a:t>
+              <a:t>6/18/2020</a:t>
             </a:fld>
             <a:endParaRPr lang="en-US"/>
           </a:p>
@@ -2381,7 +2529,7 @@
           <a:p>
             <a:fld id="{EF8CFD31-5838-49E1-8FEB-F96CA9ABA4BD}" type="datetimeFigureOut">
               <a:rPr lang="en-US" smtClean="0"/>
-              <a:t>6/17/20</a:t>
+              <a:t>6/18/2020</a:t>
             </a:fld>
             <a:endParaRPr lang="en-US"/>
           </a:p>
@@ -2669,7 +2817,7 @@
           <a:p>
             <a:fld id="{EF8CFD31-5838-49E1-8FEB-F96CA9ABA4BD}" type="datetimeFigureOut">
               <a:rPr lang="en-US" smtClean="0"/>
-              <a:t>6/17/20</a:t>
+              <a:t>6/18/2020</a:t>
             </a:fld>
             <a:endParaRPr lang="en-US"/>
           </a:p>
@@ -2910,7 +3058,7 @@
           <a:p>
             <a:fld id="{EF8CFD31-5838-49E1-8FEB-F96CA9ABA4BD}" type="datetimeFigureOut">
               <a:rPr lang="en-US" smtClean="0"/>
-              <a:t>6/17/20</a:t>
+              <a:t>6/18/2020</a:t>
             </a:fld>
             <a:endParaRPr lang="en-US"/>
           </a:p>
@@ -3445,7 +3593,7 @@
             <a:pPr lvl="1"/>
             <a:r>
               <a:rPr lang="en-US" sz="1400" dirty="0"/>
-              <a:t>Output: scores on the edges and nodes</a:t>
+              <a:t>Output: scores on the edges (true/false)</a:t>
             </a:r>
           </a:p>
           <a:p>
@@ -3506,6 +3654,290 @@
             <a:r>
               <a:rPr lang="en-US" sz="1400" dirty="0"/>
               <a:t>Analyze the scaling performance</a:t>
+            </a:r>
+          </a:p>
+        </p:txBody>
+      </p:sp>
+      <p:pic>
+        <p:nvPicPr>
+          <p:cNvPr id="13" name="Picture 12" descr="A picture containing fishing, photo, bird, large&#10;&#10;Description automatically generated">
+            <a:extLst>
+              <a:ext uri="{FF2B5EF4-FFF2-40B4-BE49-F238E27FC236}">
+                <a16:creationId xmlns:a16="http://schemas.microsoft.com/office/drawing/2014/main" id="{A5351316-3936-4367-80E7-B6A41FF6953C}"/>
+              </a:ext>
+            </a:extLst>
+          </p:cNvPr>
+          <p:cNvPicPr>
+            <a:picLocks noChangeAspect="1"/>
+          </p:cNvPicPr>
+          <p:nvPr/>
+        </p:nvPicPr>
+        <p:blipFill>
+          <a:blip r:embed="rId2">
+            <a:extLst>
+              <a:ext uri="{28A0092B-C50C-407E-A947-70E740481C1C}">
+                <a14:useLocalDpi xmlns:a14="http://schemas.microsoft.com/office/drawing/2010/main" val="0"/>
+              </a:ext>
+            </a:extLst>
+          </a:blip>
+          <a:stretch>
+            <a:fillRect/>
+          </a:stretch>
+        </p:blipFill>
+        <p:spPr>
+          <a:xfrm>
+            <a:off x="7040530" y="1765738"/>
+            <a:ext cx="2541167" cy="1429407"/>
+          </a:xfrm>
+          <a:prstGeom prst="rect">
+            <a:avLst/>
+          </a:prstGeom>
+        </p:spPr>
+      </p:pic>
+      <p:pic>
+        <p:nvPicPr>
+          <p:cNvPr id="15" name="Picture 14" descr="A close up of a bird&#10;&#10;Description automatically generated">
+            <a:extLst>
+              <a:ext uri="{FF2B5EF4-FFF2-40B4-BE49-F238E27FC236}">
+                <a16:creationId xmlns:a16="http://schemas.microsoft.com/office/drawing/2014/main" id="{3E3D5389-4934-4506-B5B1-F0063BEA4E39}"/>
+              </a:ext>
+            </a:extLst>
+          </p:cNvPr>
+          <p:cNvPicPr>
+            <a:picLocks noChangeAspect="1"/>
+          </p:cNvPicPr>
+          <p:nvPr/>
+        </p:nvPicPr>
+        <p:blipFill>
+          <a:blip r:embed="rId3">
+            <a:extLst>
+              <a:ext uri="{28A0092B-C50C-407E-A947-70E740481C1C}">
+                <a14:useLocalDpi xmlns:a14="http://schemas.microsoft.com/office/drawing/2010/main" val="0"/>
+              </a:ext>
+            </a:extLst>
+          </a:blip>
+          <a:stretch>
+            <a:fillRect/>
+          </a:stretch>
+        </p:blipFill>
+        <p:spPr>
+          <a:xfrm>
+            <a:off x="9573523" y="1765739"/>
+            <a:ext cx="2541167" cy="1429406"/>
+          </a:xfrm>
+          <a:prstGeom prst="rect">
+            <a:avLst/>
+          </a:prstGeom>
+        </p:spPr>
+      </p:pic>
+      <p:pic>
+        <p:nvPicPr>
+          <p:cNvPr id="17" name="Picture 16" descr="A picture containing photo, bird, boat, flying&#10;&#10;Description automatically generated">
+            <a:extLst>
+              <a:ext uri="{FF2B5EF4-FFF2-40B4-BE49-F238E27FC236}">
+                <a16:creationId xmlns:a16="http://schemas.microsoft.com/office/drawing/2014/main" id="{80C39624-526C-4E20-85F1-0C1C9F36729B}"/>
+              </a:ext>
+            </a:extLst>
+          </p:cNvPr>
+          <p:cNvPicPr>
+            <a:picLocks noChangeAspect="1"/>
+          </p:cNvPicPr>
+          <p:nvPr/>
+        </p:nvPicPr>
+        <p:blipFill>
+          <a:blip r:embed="rId4">
+            <a:extLst>
+              <a:ext uri="{28A0092B-C50C-407E-A947-70E740481C1C}">
+                <a14:useLocalDpi xmlns:a14="http://schemas.microsoft.com/office/drawing/2010/main" val="0"/>
+              </a:ext>
+            </a:extLst>
+          </a:blip>
+          <a:stretch>
+            <a:fillRect/>
+          </a:stretch>
+        </p:blipFill>
+        <p:spPr>
+          <a:xfrm>
+            <a:off x="7040530" y="3564371"/>
+            <a:ext cx="2541167" cy="1429406"/>
+          </a:xfrm>
+          <a:prstGeom prst="rect">
+            <a:avLst/>
+          </a:prstGeom>
+        </p:spPr>
+      </p:pic>
+      <p:pic>
+        <p:nvPicPr>
+          <p:cNvPr id="19" name="Picture 18" descr="A picture containing photo, bird, flying, boat&#10;&#10;Description automatically generated">
+            <a:extLst>
+              <a:ext uri="{FF2B5EF4-FFF2-40B4-BE49-F238E27FC236}">
+                <a16:creationId xmlns:a16="http://schemas.microsoft.com/office/drawing/2014/main" id="{BFD30C74-B219-4FBC-8423-C57450DC6334}"/>
+              </a:ext>
+            </a:extLst>
+          </p:cNvPr>
+          <p:cNvPicPr>
+            <a:picLocks noChangeAspect="1"/>
+          </p:cNvPicPr>
+          <p:nvPr/>
+        </p:nvPicPr>
+        <p:blipFill>
+          <a:blip r:embed="rId5">
+            <a:extLst>
+              <a:ext uri="{28A0092B-C50C-407E-A947-70E740481C1C}">
+                <a14:useLocalDpi xmlns:a14="http://schemas.microsoft.com/office/drawing/2010/main" val="0"/>
+              </a:ext>
+            </a:extLst>
+          </a:blip>
+          <a:stretch>
+            <a:fillRect/>
+          </a:stretch>
+        </p:blipFill>
+        <p:spPr>
+          <a:xfrm>
+            <a:off x="9581697" y="3564371"/>
+            <a:ext cx="2532993" cy="1424809"/>
+          </a:xfrm>
+          <a:prstGeom prst="rect">
+            <a:avLst/>
+          </a:prstGeom>
+        </p:spPr>
+      </p:pic>
+      <p:sp>
+        <p:nvSpPr>
+          <p:cNvPr id="20" name="TextBox 19">
+            <a:extLst>
+              <a:ext uri="{FF2B5EF4-FFF2-40B4-BE49-F238E27FC236}">
+                <a16:creationId xmlns:a16="http://schemas.microsoft.com/office/drawing/2014/main" id="{E61429FD-5446-42DD-B453-51CAAAAF6553}"/>
+              </a:ext>
+            </a:extLst>
+          </p:cNvPr>
+          <p:cNvSpPr txBox="1"/>
+          <p:nvPr/>
+        </p:nvSpPr>
+        <p:spPr>
+          <a:xfrm>
+            <a:off x="7450434" y="1358881"/>
+            <a:ext cx="1874488" cy="369332"/>
+          </a:xfrm>
+          <a:prstGeom prst="rect">
+            <a:avLst/>
+          </a:prstGeom>
+          <a:noFill/>
+        </p:spPr>
+        <p:txBody>
+          <a:bodyPr wrap="none" rtlCol="0">
+            <a:spAutoFit/>
+          </a:bodyPr>
+          <a:lstStyle/>
+          <a:p>
+            <a:r>
+              <a:rPr lang="en-US" dirty="0"/>
+              <a:t>Evt025 edges true</a:t>
+            </a:r>
+          </a:p>
+        </p:txBody>
+      </p:sp>
+      <p:sp>
+        <p:nvSpPr>
+          <p:cNvPr id="21" name="TextBox 20">
+            <a:extLst>
+              <a:ext uri="{FF2B5EF4-FFF2-40B4-BE49-F238E27FC236}">
+                <a16:creationId xmlns:a16="http://schemas.microsoft.com/office/drawing/2014/main" id="{1023C5AA-5DC2-4883-8F19-0B255C68F04C}"/>
+              </a:ext>
+            </a:extLst>
+          </p:cNvPr>
+          <p:cNvSpPr txBox="1"/>
+          <p:nvPr/>
+        </p:nvSpPr>
+        <p:spPr>
+          <a:xfrm>
+            <a:off x="9880077" y="1361925"/>
+            <a:ext cx="1980157" cy="369332"/>
+          </a:xfrm>
+          <a:prstGeom prst="rect">
+            <a:avLst/>
+          </a:prstGeom>
+          <a:noFill/>
+        </p:spPr>
+        <p:txBody>
+          <a:bodyPr wrap="none" rtlCol="0">
+            <a:spAutoFit/>
+          </a:bodyPr>
+          <a:lstStyle/>
+          <a:p>
+            <a:r>
+              <a:rPr lang="en-US" dirty="0"/>
+              <a:t>Evt025 edges score</a:t>
+            </a:r>
+          </a:p>
+        </p:txBody>
+      </p:sp>
+      <p:sp>
+        <p:nvSpPr>
+          <p:cNvPr id="22" name="TextBox 21">
+            <a:extLst>
+              <a:ext uri="{FF2B5EF4-FFF2-40B4-BE49-F238E27FC236}">
+                <a16:creationId xmlns:a16="http://schemas.microsoft.com/office/drawing/2014/main" id="{059F31EE-467F-405E-9731-0AB86A9B26B7}"/>
+              </a:ext>
+            </a:extLst>
+          </p:cNvPr>
+          <p:cNvSpPr txBox="1"/>
+          <p:nvPr/>
+        </p:nvSpPr>
+        <p:spPr>
+          <a:xfrm>
+            <a:off x="7450434" y="3215426"/>
+            <a:ext cx="1874488" cy="369332"/>
+          </a:xfrm>
+          <a:prstGeom prst="rect">
+            <a:avLst/>
+          </a:prstGeom>
+          <a:noFill/>
+        </p:spPr>
+        <p:txBody>
+          <a:bodyPr wrap="none" rtlCol="0">
+            <a:spAutoFit/>
+          </a:bodyPr>
+          <a:lstStyle/>
+          <a:p>
+            <a:r>
+              <a:rPr lang="en-US" dirty="0"/>
+              <a:t>Evt101 edges true</a:t>
+            </a:r>
+          </a:p>
+        </p:txBody>
+      </p:sp>
+      <p:sp>
+        <p:nvSpPr>
+          <p:cNvPr id="23" name="TextBox 22">
+            <a:extLst>
+              <a:ext uri="{FF2B5EF4-FFF2-40B4-BE49-F238E27FC236}">
+                <a16:creationId xmlns:a16="http://schemas.microsoft.com/office/drawing/2014/main" id="{8856E701-BB8F-4850-B733-FB90A593D590}"/>
+              </a:ext>
+            </a:extLst>
+          </p:cNvPr>
+          <p:cNvSpPr txBox="1"/>
+          <p:nvPr/>
+        </p:nvSpPr>
+        <p:spPr>
+          <a:xfrm>
+            <a:off x="9880077" y="3218470"/>
+            <a:ext cx="1980157" cy="369332"/>
+          </a:xfrm>
+          <a:prstGeom prst="rect">
+            <a:avLst/>
+          </a:prstGeom>
+          <a:noFill/>
+        </p:spPr>
+        <p:txBody>
+          <a:bodyPr wrap="none" rtlCol="0">
+            <a:spAutoFit/>
+          </a:bodyPr>
+          <a:lstStyle/>
+          <a:p>
+            <a:r>
+              <a:rPr lang="en-US" dirty="0"/>
+              <a:t>Evt101 edges score</a:t>
             </a:r>
           </a:p>
         </p:txBody>
@@ -3586,7 +4018,9 @@
         </p:nvSpPr>
         <p:spPr/>
         <p:txBody>
-          <a:bodyPr/>
+          <a:bodyPr>
+            <a:normAutofit fontScale="92500"/>
+          </a:bodyPr>
           <a:lstStyle/>
           <a:p>
             <a:pPr marL="514350" indent="-514350">
@@ -3595,7 +4029,17 @@
             </a:pPr>
             <a:r>
               <a:rPr lang="en-US" dirty="0"/>
-              <a:t>One sample is a graph generated from all the hits of a single particle, is it correct?</a:t>
+              <a:t>One sample is a graph generated from all the hits of a single particle, is it correct? (# of files should be the same as # of events) </a:t>
+            </a:r>
+            <a:r>
+              <a:rPr lang="en-US" dirty="0">
+                <a:sym typeface="Wingdings" panose="05000000000000000000" pitchFamily="2" charset="2"/>
+              </a:rPr>
+              <a:t></a:t>
+            </a:r>
+            <a:r>
+              <a:rPr lang="en-US" dirty="0"/>
+              <a:t>True</a:t>
             </a:r>
           </a:p>
           <a:p>
@@ -3605,7 +4049,17 @@
             </a:pPr>
             <a:r>
               <a:rPr lang="en-US" dirty="0"/>
-              <a:t>Could you briefly explain how you calculated the accuracy?</a:t>
+              <a:t>One event corresponds to several hits for a particle, is it correct? </a:t>
+            </a:r>
+            <a:r>
+              <a:rPr lang="en-US" dirty="0">
+                <a:sym typeface="Wingdings" panose="05000000000000000000" pitchFamily="2" charset="2"/>
+              </a:rPr>
+              <a:t></a:t>
+            </a:r>
+            <a:r>
+              <a:rPr lang="en-US" dirty="0"/>
+              <a:t>True</a:t>
             </a:r>
           </a:p>
           <a:p>
@@ -3615,16 +4069,15 @@
             </a:pPr>
             <a:r>
               <a:rPr lang="en-US" dirty="0"/>
-              <a:t>The output from </a:t>
-            </a:r>
-            <a:r>
-              <a:rPr lang="en-US" dirty="0" err="1"/>
-              <a:t>test.ipynb</a:t>
-            </a:r>
-            <a:r>
-              <a:rPr lang="en-US" dirty="0"/>
-              <a:t> contains 101 events only. Could you briefly explain what that number is?</a:t>
-            </a:r>
+              <a:t>Could you briefly explain how you calculated the accuracy? </a:t>
+            </a:r>
+            <a:r>
+              <a:rPr lang="en-US" dirty="0">
+                <a:sym typeface="Wingdings" panose="05000000000000000000" pitchFamily="2" charset="2"/>
+              </a:rPr>
+              <a:t> ratio of the correctly predicted true edges.</a:t>
+            </a:r>
+            <a:endParaRPr lang="en-US" dirty="0"/>
           </a:p>
           <a:p>
             <a:pPr marL="514350" indent="-514350">
@@ -3633,16 +4086,23 @@
             </a:pPr>
             <a:r>
               <a:rPr lang="en-US" dirty="0"/>
-              <a:t>Can we confirm the GNN model is MPNN based on </a:t>
-            </a:r>
-            <a:r>
-              <a:rPr lang="en-US"/>
-              <a:t>Interaction Networks</a:t>
+              <a:t>The output from </a:t>
+            </a:r>
+            <a:r>
+              <a:rPr lang="en-US" dirty="0" err="1"/>
+              <a:t>test.ipynb</a:t>
             </a:r>
             <a:r>
               <a:rPr lang="en-US" dirty="0"/>
-              <a:t>?</a:t>
-            </a:r>
+              <a:t> contains 101 events only. Could you briefly explain what that number is? </a:t>
+            </a:r>
+            <a:r>
+              <a:rPr lang="en-US" dirty="0">
+                <a:sym typeface="Wingdings" panose="05000000000000000000" pitchFamily="2" charset="2"/>
+              </a:rPr>
+              <a:t> It’s an arbitrary number</a:t>
+            </a:r>
+            <a:endParaRPr lang="en-US" dirty="0"/>
           </a:p>
           <a:p>
             <a:pPr marL="514350" indent="-514350">
@@ -3651,8 +4111,23 @@
             </a:pPr>
             <a:r>
               <a:rPr lang="en-US" dirty="0"/>
-              <a:t>One event corresponds to several hits for a particle, is it correct?</a:t>
-            </a:r>
+              <a:t>Can we confirm the GNN model is MPNN based on Interaction </a:t>
+            </a:r>
+            <a:r>
+              <a:rPr lang="en-US" dirty="0" err="1"/>
+              <a:t>Netwokrs</a:t>
+            </a:r>
+            <a:r>
+              <a:rPr lang="en-US" dirty="0"/>
+              <a:t>? </a:t>
+            </a:r>
+            <a:r>
+              <a:rPr lang="en-US" dirty="0">
+                <a:sym typeface="Wingdings" panose="05000000000000000000" pitchFamily="2" charset="2"/>
+              </a:rPr>
+              <a:t> True</a:t>
+            </a:r>
+            <a:endParaRPr lang="en-US" dirty="0"/>
           </a:p>
           <a:p>
             <a:pPr marL="514350" indent="-514350">

</xml_diff>